<commit_message>
Added materials for 2nd lesson
</commit_message>
<xml_diff>
--- a/presentations/1. Mobile app development.pptx
+++ b/presentations/1. Mobile app development.pptx
@@ -280,7 +280,7 @@
           <a:p>
             <a:fld id="{711D71D7-CC0D-428B-A886-0106692CFA8F}" type="datetimeFigureOut">
               <a:rPr lang="en-US" smtClean="0"/>
-              <a:t>1/12/2022</a:t>
+              <a:t>1/13/2022</a:t>
             </a:fld>
             <a:endParaRPr lang="en-US"/>
           </a:p>
@@ -450,7 +450,7 @@
           <a:p>
             <a:fld id="{711D71D7-CC0D-428B-A886-0106692CFA8F}" type="datetimeFigureOut">
               <a:rPr lang="en-US" smtClean="0"/>
-              <a:t>1/12/2022</a:t>
+              <a:t>1/13/2022</a:t>
             </a:fld>
             <a:endParaRPr lang="en-US"/>
           </a:p>
@@ -630,7 +630,7 @@
           <a:p>
             <a:fld id="{711D71D7-CC0D-428B-A886-0106692CFA8F}" type="datetimeFigureOut">
               <a:rPr lang="en-US" smtClean="0"/>
-              <a:t>1/12/2022</a:t>
+              <a:t>1/13/2022</a:t>
             </a:fld>
             <a:endParaRPr lang="en-US"/>
           </a:p>
@@ -800,7 +800,7 @@
           <a:p>
             <a:fld id="{711D71D7-CC0D-428B-A886-0106692CFA8F}" type="datetimeFigureOut">
               <a:rPr lang="en-US" smtClean="0"/>
-              <a:t>1/12/2022</a:t>
+              <a:t>1/13/2022</a:t>
             </a:fld>
             <a:endParaRPr lang="en-US"/>
           </a:p>
@@ -1046,7 +1046,7 @@
           <a:p>
             <a:fld id="{711D71D7-CC0D-428B-A886-0106692CFA8F}" type="datetimeFigureOut">
               <a:rPr lang="en-US" smtClean="0"/>
-              <a:t>1/12/2022</a:t>
+              <a:t>1/13/2022</a:t>
             </a:fld>
             <a:endParaRPr lang="en-US"/>
           </a:p>
@@ -1278,7 +1278,7 @@
           <a:p>
             <a:fld id="{711D71D7-CC0D-428B-A886-0106692CFA8F}" type="datetimeFigureOut">
               <a:rPr lang="en-US" smtClean="0"/>
-              <a:t>1/12/2022</a:t>
+              <a:t>1/13/2022</a:t>
             </a:fld>
             <a:endParaRPr lang="en-US"/>
           </a:p>
@@ -1645,7 +1645,7 @@
           <a:p>
             <a:fld id="{711D71D7-CC0D-428B-A886-0106692CFA8F}" type="datetimeFigureOut">
               <a:rPr lang="en-US" smtClean="0"/>
-              <a:t>1/12/2022</a:t>
+              <a:t>1/13/2022</a:t>
             </a:fld>
             <a:endParaRPr lang="en-US"/>
           </a:p>
@@ -1763,7 +1763,7 @@
           <a:p>
             <a:fld id="{711D71D7-CC0D-428B-A886-0106692CFA8F}" type="datetimeFigureOut">
               <a:rPr lang="en-US" smtClean="0"/>
-              <a:t>1/12/2022</a:t>
+              <a:t>1/13/2022</a:t>
             </a:fld>
             <a:endParaRPr lang="en-US"/>
           </a:p>
@@ -1858,7 +1858,7 @@
           <a:p>
             <a:fld id="{711D71D7-CC0D-428B-A886-0106692CFA8F}" type="datetimeFigureOut">
               <a:rPr lang="en-US" smtClean="0"/>
-              <a:t>1/12/2022</a:t>
+              <a:t>1/13/2022</a:t>
             </a:fld>
             <a:endParaRPr lang="en-US"/>
           </a:p>
@@ -2135,7 +2135,7 @@
           <a:p>
             <a:fld id="{711D71D7-CC0D-428B-A886-0106692CFA8F}" type="datetimeFigureOut">
               <a:rPr lang="en-US" smtClean="0"/>
-              <a:t>1/12/2022</a:t>
+              <a:t>1/13/2022</a:t>
             </a:fld>
             <a:endParaRPr lang="en-US"/>
           </a:p>
@@ -2392,7 +2392,7 @@
           <a:p>
             <a:fld id="{711D71D7-CC0D-428B-A886-0106692CFA8F}" type="datetimeFigureOut">
               <a:rPr lang="en-US" smtClean="0"/>
-              <a:t>1/12/2022</a:t>
+              <a:t>1/13/2022</a:t>
             </a:fld>
             <a:endParaRPr lang="en-US"/>
           </a:p>
@@ -2625,7 +2625,7 @@
           <a:p>
             <a:fld id="{711D71D7-CC0D-428B-A886-0106692CFA8F}" type="datetimeFigureOut">
               <a:rPr lang="en-US" smtClean="0"/>
-              <a:t>1/12/2022</a:t>
+              <a:t>1/13/2022</a:t>
             </a:fld>
             <a:endParaRPr lang="en-US"/>
           </a:p>
@@ -3426,8 +3426,8 @@
           </a:p>
         </p:txBody>
       </p:sp>
-      <mc:AlternateContent xmlns:mc="http://schemas.openxmlformats.org/markup-compatibility/2006">
-        <mc:Choice xmlns:p14="http://schemas.microsoft.com/office/powerpoint/2010/main" xmlns:aink="http://schemas.microsoft.com/office/drawing/2016/ink" Requires="p14 aink">
+      <mc:AlternateContent xmlns:mc="http://schemas.openxmlformats.org/markup-compatibility/2006" xmlns:p14="http://schemas.microsoft.com/office/powerpoint/2010/main" xmlns:aink="http://schemas.microsoft.com/office/drawing/2016/ink">
+        <mc:Choice Requires="p14 aink">
           <p:contentPart p14:bwMode="auto" r:id="rId6">
             <p14:nvContentPartPr>
               <p14:cNvPr id="44" name="Ink 43">
@@ -3446,7 +3446,7 @@
             </p14:xfrm>
           </p:contentPart>
         </mc:Choice>
-        <mc:Fallback>
+        <mc:Fallback xmlns="">
           <p:pic>
             <p:nvPicPr>
               <p:cNvPr id="44" name="Ink 43">
@@ -3951,8 +3951,8 @@
         </p:blipFill>
         <p:spPr>
           <a:xfrm>
-            <a:off x="1207648" y="1465260"/>
-            <a:ext cx="3858575" cy="3927480"/>
+            <a:off x="1187361" y="2138866"/>
+            <a:ext cx="2534998" cy="2580267"/>
           </a:xfrm>
           <a:prstGeom prst="rect">
             <a:avLst/>
@@ -3981,8 +3981,8 @@
         </p:blipFill>
         <p:spPr>
           <a:xfrm>
-            <a:off x="7125778" y="1465261"/>
-            <a:ext cx="3881271" cy="3927479"/>
+            <a:off x="8469641" y="2138866"/>
+            <a:ext cx="2549910" cy="2580268"/>
           </a:xfrm>
           <a:prstGeom prst="rect">
             <a:avLst/>
@@ -4003,7 +4003,7 @@
         </p:nvSpPr>
         <p:spPr>
           <a:xfrm>
-            <a:off x="1786244" y="655780"/>
+            <a:off x="1104169" y="886612"/>
             <a:ext cx="2701381" cy="461665"/>
           </a:xfrm>
           <a:prstGeom prst="rect">
@@ -4043,7 +4043,7 @@
         </p:nvSpPr>
         <p:spPr>
           <a:xfrm>
-            <a:off x="7592291" y="655780"/>
+            <a:off x="8270473" y="886612"/>
             <a:ext cx="2948243" cy="461665"/>
           </a:xfrm>
           <a:prstGeom prst="rect">
@@ -4083,7 +4083,7 @@
         </p:nvSpPr>
         <p:spPr>
           <a:xfrm>
-            <a:off x="2538052" y="5740552"/>
+            <a:off x="1855977" y="5509722"/>
             <a:ext cx="1197764" cy="461665"/>
           </a:xfrm>
           <a:prstGeom prst="rect">
@@ -4123,7 +4123,7 @@
         </p:nvSpPr>
         <p:spPr>
           <a:xfrm>
-            <a:off x="8333602" y="5740552"/>
+            <a:off x="9011784" y="5509723"/>
             <a:ext cx="1465619" cy="461665"/>
           </a:xfrm>
           <a:prstGeom prst="rect">
@@ -4142,6 +4142,116 @@
                 <a:latin typeface="Segoe UI Variable Display Light" pitchFamily="2" charset="0"/>
               </a:rPr>
               <a:t>flutter.dev</a:t>
+            </a:r>
+            <a:endParaRPr lang="en-US" sz="2400" dirty="0">
+              <a:latin typeface="Segoe UI Variable Display Light" pitchFamily="2" charset="0"/>
+            </a:endParaRPr>
+          </a:p>
+        </p:txBody>
+      </p:sp>
+      <p:pic>
+        <p:nvPicPr>
+          <p:cNvPr id="3" name="Picture 2">
+            <a:extLst>
+              <a:ext uri="{FF2B5EF4-FFF2-40B4-BE49-F238E27FC236}">
+                <a16:creationId xmlns:a16="http://schemas.microsoft.com/office/drawing/2014/main" id="{D9F4016A-14F4-4520-81CD-3B42445BC3C9}"/>
+              </a:ext>
+            </a:extLst>
+          </p:cNvPr>
+          <p:cNvPicPr>
+            <a:picLocks noChangeAspect="1"/>
+          </p:cNvPicPr>
+          <p:nvPr/>
+        </p:nvPicPr>
+        <p:blipFill>
+          <a:blip r:embed="rId4"/>
+          <a:stretch>
+            <a:fillRect/>
+          </a:stretch>
+        </p:blipFill>
+        <p:spPr>
+          <a:xfrm>
+            <a:off x="4821410" y="2138866"/>
+            <a:ext cx="2549180" cy="2580267"/>
+          </a:xfrm>
+          <a:prstGeom prst="rect">
+            <a:avLst/>
+          </a:prstGeom>
+        </p:spPr>
+      </p:pic>
+      <p:sp>
+        <p:nvSpPr>
+          <p:cNvPr id="10" name="TextBox 9">
+            <a:extLst>
+              <a:ext uri="{FF2B5EF4-FFF2-40B4-BE49-F238E27FC236}">
+                <a16:creationId xmlns:a16="http://schemas.microsoft.com/office/drawing/2014/main" id="{579C4F6D-08AA-4005-961D-8CEF45BCE109}"/>
+              </a:ext>
+            </a:extLst>
+          </p:cNvPr>
+          <p:cNvSpPr txBox="1"/>
+          <p:nvPr/>
+        </p:nvSpPr>
+        <p:spPr>
+          <a:xfrm>
+            <a:off x="5500324" y="886611"/>
+            <a:ext cx="1191352" cy="461665"/>
+          </a:xfrm>
+          <a:prstGeom prst="rect">
+            <a:avLst/>
+          </a:prstGeom>
+          <a:noFill/>
+        </p:spPr>
+        <p:txBody>
+          <a:bodyPr wrap="none" rtlCol="0">
+            <a:spAutoFit/>
+          </a:bodyPr>
+          <a:lstStyle/>
+          <a:p>
+            <a:r>
+              <a:rPr lang="en-US" sz="2400" b="1" dirty="0">
+                <a:solidFill>
+                  <a:srgbClr val="002060"/>
+                </a:solidFill>
+                <a:latin typeface="Segoe UI Variable Display Light" pitchFamily="2" charset="0"/>
+              </a:rPr>
+              <a:t>DartPad</a:t>
+            </a:r>
+          </a:p>
+        </p:txBody>
+      </p:sp>
+      <p:sp>
+        <p:nvSpPr>
+          <p:cNvPr id="11" name="TextBox 10">
+            <a:extLst>
+              <a:ext uri="{FF2B5EF4-FFF2-40B4-BE49-F238E27FC236}">
+                <a16:creationId xmlns:a16="http://schemas.microsoft.com/office/drawing/2014/main" id="{28E86DBC-8768-45F7-9B9A-8E760F89EA25}"/>
+              </a:ext>
+            </a:extLst>
+          </p:cNvPr>
+          <p:cNvSpPr txBox="1"/>
+          <p:nvPr/>
+        </p:nvSpPr>
+        <p:spPr>
+          <a:xfrm>
+            <a:off x="5257469" y="5505414"/>
+            <a:ext cx="1677062" cy="461665"/>
+          </a:xfrm>
+          <a:prstGeom prst="rect">
+            <a:avLst/>
+          </a:prstGeom>
+          <a:noFill/>
+        </p:spPr>
+        <p:txBody>
+          <a:bodyPr wrap="none" rtlCol="0">
+            <a:spAutoFit/>
+          </a:bodyPr>
+          <a:lstStyle/>
+          <a:p>
+            <a:r>
+              <a:rPr lang="en-US" sz="2400" dirty="0" err="1">
+                <a:latin typeface="Segoe UI Variable Display Light" pitchFamily="2" charset="0"/>
+              </a:rPr>
+              <a:t>dartpad.dev</a:t>
             </a:r>
             <a:endParaRPr lang="en-US" sz="2400" dirty="0">
               <a:latin typeface="Segoe UI Variable Display Light" pitchFamily="2" charset="0"/>
@@ -4179,12 +4289,52 @@
           <a:chExt cx="0" cy="0"/>
         </a:xfrm>
       </p:grpSpPr>
+      <p:sp>
+        <p:nvSpPr>
+          <p:cNvPr id="8" name="TextBox 7">
+            <a:extLst>
+              <a:ext uri="{FF2B5EF4-FFF2-40B4-BE49-F238E27FC236}">
+                <a16:creationId xmlns:a16="http://schemas.microsoft.com/office/drawing/2014/main" id="{B5733FD8-2866-40CF-917E-3134AB6F1C25}"/>
+              </a:ext>
+            </a:extLst>
+          </p:cNvPr>
+          <p:cNvSpPr txBox="1"/>
+          <p:nvPr/>
+        </p:nvSpPr>
+        <p:spPr>
+          <a:xfrm>
+            <a:off x="7370618" y="2967335"/>
+            <a:ext cx="3895246" cy="923330"/>
+          </a:xfrm>
+          <a:prstGeom prst="rect">
+            <a:avLst/>
+          </a:prstGeom>
+          <a:noFill/>
+        </p:spPr>
+        <p:txBody>
+          <a:bodyPr wrap="square" rtlCol="0">
+            <a:spAutoFit/>
+          </a:bodyPr>
+          <a:lstStyle/>
+          <a:p>
+            <a:r>
+              <a:rPr lang="en-US" sz="5400" dirty="0">
+                <a:solidFill>
+                  <a:srgbClr val="002060"/>
+                </a:solidFill>
+                <a:latin typeface="Segoe UI Variable Display Light" pitchFamily="2" charset="0"/>
+              </a:rPr>
+              <a:t>Coding time!</a:t>
+            </a:r>
+          </a:p>
+        </p:txBody>
+      </p:sp>
       <p:pic>
         <p:nvPicPr>
-          <p:cNvPr id="5" name="Picture 4">
+          <p:cNvPr id="3" name="Picture 2">
             <a:extLst>
               <a:ext uri="{FF2B5EF4-FFF2-40B4-BE49-F238E27FC236}">
-                <a16:creationId xmlns:a16="http://schemas.microsoft.com/office/drawing/2014/main" id="{CC0F7DEA-991F-4883-B3F8-83D339BFF9C0}"/>
+                <a16:creationId xmlns:a16="http://schemas.microsoft.com/office/drawing/2014/main" id="{205FC165-9AAE-4E0B-8BF0-C41ED1145A54}"/>
               </a:ext>
             </a:extLst>
           </p:cNvPr>
@@ -4201,8 +4351,8 @@
         </p:blipFill>
         <p:spPr>
           <a:xfrm>
-            <a:off x="837613" y="1105938"/>
-            <a:ext cx="6533005" cy="4646124"/>
+            <a:off x="664797" y="914317"/>
+            <a:ext cx="6705821" cy="5029365"/>
           </a:xfrm>
           <a:prstGeom prst="rect">
             <a:avLst/>
@@ -4226,46 +4376,6 @@
           </a:sp3d>
         </p:spPr>
       </p:pic>
-      <p:sp>
-        <p:nvSpPr>
-          <p:cNvPr id="8" name="TextBox 7">
-            <a:extLst>
-              <a:ext uri="{FF2B5EF4-FFF2-40B4-BE49-F238E27FC236}">
-                <a16:creationId xmlns:a16="http://schemas.microsoft.com/office/drawing/2014/main" id="{B5733FD8-2866-40CF-917E-3134AB6F1C25}"/>
-              </a:ext>
-            </a:extLst>
-          </p:cNvPr>
-          <p:cNvSpPr txBox="1"/>
-          <p:nvPr/>
-        </p:nvSpPr>
-        <p:spPr>
-          <a:xfrm>
-            <a:off x="7370618" y="2967335"/>
-            <a:ext cx="3895246" cy="923330"/>
-          </a:xfrm>
-          <a:prstGeom prst="rect">
-            <a:avLst/>
-          </a:prstGeom>
-          <a:noFill/>
-        </p:spPr>
-        <p:txBody>
-          <a:bodyPr wrap="square" rtlCol="0">
-            <a:spAutoFit/>
-          </a:bodyPr>
-          <a:lstStyle/>
-          <a:p>
-            <a:r>
-              <a:rPr lang="en-US" sz="5400" dirty="0">
-                <a:solidFill>
-                  <a:srgbClr val="002060"/>
-                </a:solidFill>
-                <a:latin typeface="Segoe UI Variable Display Light" pitchFamily="2" charset="0"/>
-              </a:rPr>
-              <a:t>Coding time!</a:t>
-            </a:r>
-          </a:p>
-        </p:txBody>
-      </p:sp>
     </p:spTree>
     <p:extLst>
       <p:ext uri="{BB962C8B-B14F-4D97-AF65-F5344CB8AC3E}">

</xml_diff>